<commit_message>
Presentaciones Almacenamientos, MC y DTC, Radio button y checkbox
</commit_message>
<xml_diff>
--- a/Presentaciones/Segundo Parcial/Controles de Almacenamiento.pptx
+++ b/Presentaciones/Segundo Parcial/Controles de Almacenamiento.pptx
@@ -120,6 +120,11 @@
       </a:defRPr>
     </a:lvl9pPr>
   </p:defaultTextStyle>
+  <p:extLst>
+    <p:ext uri="{EFAFB233-063F-42B5-8137-9DF3F51BA10A}">
+      <p15:sldGuideLst xmlns:p15="http://schemas.microsoft.com/office/powerpoint/2012/main"/>
+    </p:ext>
+  </p:extLst>
 </p:presentation>
 </file>
 
@@ -205,7 +210,7 @@
           <a:p>
             <a:fld id="{DE377FA4-E963-4FA6-B2B2-23F925C578DD}" type="datetimeFigureOut">
               <a:rPr lang="es-MX" smtClean="0"/>
-              <a:t>18/03/2019</a:t>
+              <a:t>02/04/2019</a:t>
             </a:fld>
             <a:endParaRPr lang="es-MX"/>
           </a:p>
@@ -649,7 +654,7 @@
           <a:p>
             <a:fld id="{D8D9B86A-D9F5-4A93-AC15-C35445F48BF1}" type="datetime1">
               <a:rPr lang="es-MX" smtClean="0"/>
-              <a:t>18/03/2019</a:t>
+              <a:t>02/04/2019</a:t>
             </a:fld>
             <a:endParaRPr lang="es-MX"/>
           </a:p>
@@ -822,7 +827,7 @@
           <a:p>
             <a:fld id="{7A462ED0-636A-477E-9FC8-F489326D9268}" type="datetime1">
               <a:rPr lang="es-MX" smtClean="0"/>
-              <a:t>18/03/2019</a:t>
+              <a:t>02/04/2019</a:t>
             </a:fld>
             <a:endParaRPr lang="es-MX"/>
           </a:p>
@@ -1048,7 +1053,7 @@
           <a:p>
             <a:fld id="{C6D46FD3-18B7-4E09-9B81-54615B7B3381}" type="datetime1">
               <a:rPr lang="es-MX" smtClean="0"/>
-              <a:t>18/03/2019</a:t>
+              <a:t>02/04/2019</a:t>
             </a:fld>
             <a:endParaRPr lang="es-MX"/>
           </a:p>
@@ -1231,7 +1236,7 @@
           <a:p>
             <a:fld id="{4CB5A5C5-F360-45E4-A6CE-9249CBEA487C}" type="datetime1">
               <a:rPr lang="es-MX" smtClean="0"/>
-              <a:t>18/03/2019</a:t>
+              <a:t>02/04/2019</a:t>
             </a:fld>
             <a:endParaRPr lang="es-MX"/>
           </a:p>
@@ -1540,7 +1545,7 @@
           <a:p>
             <a:fld id="{A648AD40-63E6-4523-881B-3EF7197C3BDC}" type="datetime1">
               <a:rPr lang="es-MX" smtClean="0"/>
-              <a:t>18/03/2019</a:t>
+              <a:t>02/04/2019</a:t>
             </a:fld>
             <a:endParaRPr lang="es-MX"/>
           </a:p>
@@ -1847,7 +1852,7 @@
           <a:p>
             <a:fld id="{99FC3473-B407-4053-B1DF-ABE212BE9F8C}" type="datetime1">
               <a:rPr lang="es-MX" smtClean="0"/>
-              <a:t>18/03/2019</a:t>
+              <a:t>02/04/2019</a:t>
             </a:fld>
             <a:endParaRPr lang="es-MX"/>
           </a:p>
@@ -2272,7 +2277,7 @@
           <a:p>
             <a:fld id="{8400BAED-3183-4041-A7A9-971EF2A42683}" type="datetime1">
               <a:rPr lang="es-MX" smtClean="0"/>
-              <a:t>18/03/2019</a:t>
+              <a:t>02/04/2019</a:t>
             </a:fld>
             <a:endParaRPr lang="es-MX"/>
           </a:p>
@@ -2393,7 +2398,7 @@
           <a:p>
             <a:fld id="{A8DA5708-1BA6-445B-B42B-8CE512E90DF3}" type="datetime1">
               <a:rPr lang="es-MX" smtClean="0"/>
-              <a:t>18/03/2019</a:t>
+              <a:t>02/04/2019</a:t>
             </a:fld>
             <a:endParaRPr lang="es-MX"/>
           </a:p>
@@ -2491,7 +2496,7 @@
           <a:p>
             <a:fld id="{EBFC2009-712C-44CB-829C-C8C6808CDCA0}" type="datetime1">
               <a:rPr lang="es-MX" smtClean="0"/>
-              <a:t>18/03/2019</a:t>
+              <a:t>02/04/2019</a:t>
             </a:fld>
             <a:endParaRPr lang="es-MX"/>
           </a:p>
@@ -2767,7 +2772,7 @@
           <a:p>
             <a:fld id="{F7593F3D-E7B5-4A1C-8A56-8C7E84893F9B}" type="datetime1">
               <a:rPr lang="es-MX" smtClean="0"/>
-              <a:t>18/03/2019</a:t>
+              <a:t>02/04/2019</a:t>
             </a:fld>
             <a:endParaRPr lang="es-MX"/>
           </a:p>
@@ -3035,7 +3040,7 @@
           <a:p>
             <a:fld id="{8913CF4B-38AA-4F47-B160-9219799EDC80}" type="datetime1">
               <a:rPr lang="es-MX" smtClean="0"/>
-              <a:t>18/03/2019</a:t>
+              <a:t>02/04/2019</a:t>
             </a:fld>
             <a:endParaRPr lang="es-MX"/>
           </a:p>
@@ -3287,7 +3292,7 @@
           <a:p>
             <a:fld id="{366B5F3D-A14B-4A1B-AFB7-52E2544DFDDC}" type="datetime1">
               <a:rPr lang="es-MX" smtClean="0"/>
-              <a:t>18/03/2019</a:t>
+              <a:t>02/04/2019</a:t>
             </a:fld>
             <a:endParaRPr lang="es-MX"/>
           </a:p>

</xml_diff>